<commit_message>
adding datasets for day 1
</commit_message>
<xml_diff>
--- a/Day2/Project/AFSWorkshop.plumeria.pptx
+++ b/Day2/Project/AFSWorkshop.plumeria.pptx
@@ -10,7 +10,8 @@
     <p:sldId id="258" r:id="rId4"/>
     <p:sldId id="261" r:id="rId5"/>
     <p:sldId id="260" r:id="rId6"/>
-    <p:sldId id="259" r:id="rId7"/>
+    <p:sldId id="262" r:id="rId7"/>
+    <p:sldId id="259" r:id="rId8"/>
   </p:sldIdLst>
   <p:sldSz cx="12192000" cy="6858000"/>
   <p:notesSz cx="6858000" cy="9144000"/>
@@ -109,6 +110,11 @@
       </a:defRPr>
     </a:lvl9pPr>
   </p:defaultTextStyle>
+  <p:extLst>
+    <p:ext uri="{EFAFB233-063F-42B5-8137-9DF3F51BA10A}">
+      <p15:sldGuideLst xmlns:p15="http://schemas.microsoft.com/office/powerpoint/2012/main"/>
+    </p:ext>
+  </p:extLst>
 </p:presentation>
 </file>
 
@@ -259,7 +265,7 @@
           <a:p>
             <a:fld id="{1662C084-7141-476F-9640-CE0148C2D93C}" type="datetimeFigureOut">
               <a:rPr lang="en-US" smtClean="0"/>
-              <a:t>7/10/2024</a:t>
+              <a:t>7/26/2024</a:t>
             </a:fld>
             <a:endParaRPr lang="en-US"/>
           </a:p>
@@ -457,7 +463,7 @@
           <a:p>
             <a:fld id="{1662C084-7141-476F-9640-CE0148C2D93C}" type="datetimeFigureOut">
               <a:rPr lang="en-US" smtClean="0"/>
-              <a:t>7/10/2024</a:t>
+              <a:t>7/26/2024</a:t>
             </a:fld>
             <a:endParaRPr lang="en-US"/>
           </a:p>
@@ -665,7 +671,7 @@
           <a:p>
             <a:fld id="{1662C084-7141-476F-9640-CE0148C2D93C}" type="datetimeFigureOut">
               <a:rPr lang="en-US" smtClean="0"/>
-              <a:t>7/10/2024</a:t>
+              <a:t>7/26/2024</a:t>
             </a:fld>
             <a:endParaRPr lang="en-US"/>
           </a:p>
@@ -863,7 +869,7 @@
           <a:p>
             <a:fld id="{1662C084-7141-476F-9640-CE0148C2D93C}" type="datetimeFigureOut">
               <a:rPr lang="en-US" smtClean="0"/>
-              <a:t>7/10/2024</a:t>
+              <a:t>7/26/2024</a:t>
             </a:fld>
             <a:endParaRPr lang="en-US"/>
           </a:p>
@@ -1138,7 +1144,7 @@
           <a:p>
             <a:fld id="{1662C084-7141-476F-9640-CE0148C2D93C}" type="datetimeFigureOut">
               <a:rPr lang="en-US" smtClean="0"/>
-              <a:t>7/10/2024</a:t>
+              <a:t>7/26/2024</a:t>
             </a:fld>
             <a:endParaRPr lang="en-US"/>
           </a:p>
@@ -1403,7 +1409,7 @@
           <a:p>
             <a:fld id="{1662C084-7141-476F-9640-CE0148C2D93C}" type="datetimeFigureOut">
               <a:rPr lang="en-US" smtClean="0"/>
-              <a:t>7/10/2024</a:t>
+              <a:t>7/26/2024</a:t>
             </a:fld>
             <a:endParaRPr lang="en-US"/>
           </a:p>
@@ -1815,7 +1821,7 @@
           <a:p>
             <a:fld id="{1662C084-7141-476F-9640-CE0148C2D93C}" type="datetimeFigureOut">
               <a:rPr lang="en-US" smtClean="0"/>
-              <a:t>7/10/2024</a:t>
+              <a:t>7/26/2024</a:t>
             </a:fld>
             <a:endParaRPr lang="en-US"/>
           </a:p>
@@ -1956,7 +1962,7 @@
           <a:p>
             <a:fld id="{1662C084-7141-476F-9640-CE0148C2D93C}" type="datetimeFigureOut">
               <a:rPr lang="en-US" smtClean="0"/>
-              <a:t>7/10/2024</a:t>
+              <a:t>7/26/2024</a:t>
             </a:fld>
             <a:endParaRPr lang="en-US"/>
           </a:p>
@@ -2069,7 +2075,7 @@
           <a:p>
             <a:fld id="{1662C084-7141-476F-9640-CE0148C2D93C}" type="datetimeFigureOut">
               <a:rPr lang="en-US" smtClean="0"/>
-              <a:t>7/10/2024</a:t>
+              <a:t>7/26/2024</a:t>
             </a:fld>
             <a:endParaRPr lang="en-US"/>
           </a:p>
@@ -2380,7 +2386,7 @@
           <a:p>
             <a:fld id="{1662C084-7141-476F-9640-CE0148C2D93C}" type="datetimeFigureOut">
               <a:rPr lang="en-US" smtClean="0"/>
-              <a:t>7/10/2024</a:t>
+              <a:t>7/26/2024</a:t>
             </a:fld>
             <a:endParaRPr lang="en-US"/>
           </a:p>
@@ -2668,7 +2674,7 @@
           <a:p>
             <a:fld id="{1662C084-7141-476F-9640-CE0148C2D93C}" type="datetimeFigureOut">
               <a:rPr lang="en-US" smtClean="0"/>
-              <a:t>7/10/2024</a:t>
+              <a:t>7/26/2024</a:t>
             </a:fld>
             <a:endParaRPr lang="en-US"/>
           </a:p>
@@ -2909,7 +2915,7 @@
           <a:p>
             <a:fld id="{1662C084-7141-476F-9640-CE0148C2D93C}" type="datetimeFigureOut">
               <a:rPr lang="en-US" smtClean="0"/>
-              <a:t>7/10/2024</a:t>
+              <a:t>7/26/2024</a:t>
             </a:fld>
             <a:endParaRPr lang="en-US"/>
           </a:p>
@@ -5299,6 +5305,1669 @@
   <p:cSld>
     <p:bg>
       <p:bgPr>
+        <a:solidFill>
+          <a:srgbClr val="D3E427"/>
+        </a:solidFill>
+        <a:effectLst/>
+      </p:bgPr>
+    </p:bg>
+    <p:spTree>
+      <p:nvGrpSpPr>
+        <p:cNvPr id="1" name=""/>
+        <p:cNvGrpSpPr/>
+        <p:nvPr/>
+      </p:nvGrpSpPr>
+      <p:grpSpPr>
+        <a:xfrm>
+          <a:off x="0" y="0"/>
+          <a:ext cx="0" cy="0"/>
+          <a:chOff x="0" y="0"/>
+          <a:chExt cx="0" cy="0"/>
+        </a:xfrm>
+      </p:grpSpPr>
+      <p:graphicFrame>
+        <p:nvGraphicFramePr>
+          <p:cNvPr id="2" name="Table 2">
+            <a:extLst>
+              <a:ext uri="{FF2B5EF4-FFF2-40B4-BE49-F238E27FC236}">
+                <a16:creationId xmlns:a16="http://schemas.microsoft.com/office/drawing/2014/main" id="{2DACDF03-9751-47F4-8A27-2389F30DF295}"/>
+              </a:ext>
+            </a:extLst>
+          </p:cNvPr>
+          <p:cNvGraphicFramePr>
+            <a:graphicFrameLocks noGrp="1"/>
+          </p:cNvGraphicFramePr>
+          <p:nvPr>
+            <p:extLst>
+              <p:ext uri="{D42A27DB-BD31-4B8C-83A1-F6EECF244321}">
+                <p14:modId xmlns:p14="http://schemas.microsoft.com/office/powerpoint/2010/main" val="3224266835"/>
+              </p:ext>
+            </p:extLst>
+          </p:nvPr>
+        </p:nvGraphicFramePr>
+        <p:xfrm>
+          <a:off x="2614725" y="1887793"/>
+          <a:ext cx="6962550" cy="3301502"/>
+        </p:xfrm>
+        <a:graphic>
+          <a:graphicData uri="http://schemas.openxmlformats.org/drawingml/2006/table">
+            <a:tbl>
+              <a:tblPr firstRow="1" bandRow="1">
+                <a:tableStyleId>{2D5ABB26-0587-4C30-8999-92F81FD0307C}</a:tableStyleId>
+              </a:tblPr>
+              <a:tblGrid>
+                <a:gridCol w="1392510">
+                  <a:extLst>
+                    <a:ext uri="{9D8B030D-6E8A-4147-A177-3AD203B41FA5}">
+                      <a16:colId xmlns:a16="http://schemas.microsoft.com/office/drawing/2014/main" val="2773366569"/>
+                    </a:ext>
+                  </a:extLst>
+                </a:gridCol>
+                <a:gridCol w="1392510">
+                  <a:extLst>
+                    <a:ext uri="{9D8B030D-6E8A-4147-A177-3AD203B41FA5}">
+                      <a16:colId xmlns:a16="http://schemas.microsoft.com/office/drawing/2014/main" val="3740290521"/>
+                    </a:ext>
+                  </a:extLst>
+                </a:gridCol>
+                <a:gridCol w="1392510">
+                  <a:extLst>
+                    <a:ext uri="{9D8B030D-6E8A-4147-A177-3AD203B41FA5}">
+                      <a16:colId xmlns:a16="http://schemas.microsoft.com/office/drawing/2014/main" val="610340287"/>
+                    </a:ext>
+                  </a:extLst>
+                </a:gridCol>
+                <a:gridCol w="1392510">
+                  <a:extLst>
+                    <a:ext uri="{9D8B030D-6E8A-4147-A177-3AD203B41FA5}">
+                      <a16:colId xmlns:a16="http://schemas.microsoft.com/office/drawing/2014/main" val="2371945439"/>
+                    </a:ext>
+                  </a:extLst>
+                </a:gridCol>
+                <a:gridCol w="1392510">
+                  <a:extLst>
+                    <a:ext uri="{9D8B030D-6E8A-4147-A177-3AD203B41FA5}">
+                      <a16:colId xmlns:a16="http://schemas.microsoft.com/office/drawing/2014/main" val="4271476138"/>
+                    </a:ext>
+                  </a:extLst>
+                </a:gridCol>
+              </a:tblGrid>
+              <a:tr h="639650">
+                <a:tc>
+                  <a:txBody>
+                    <a:bodyPr/>
+                    <a:lstStyle/>
+                    <a:p>
+                      <a:endParaRPr lang="en-US" dirty="0"/>
+                    </a:p>
+                  </a:txBody>
+                  <a:tcPr>
+                    <a:lnL w="12700" cap="flat" cmpd="sng" algn="ctr">
+                      <a:solidFill>
+                        <a:schemeClr val="tx1"/>
+                      </a:solidFill>
+                      <a:prstDash val="solid"/>
+                      <a:round/>
+                      <a:headEnd type="none" w="med" len="med"/>
+                      <a:tailEnd type="none" w="med" len="med"/>
+                    </a:lnL>
+                    <a:lnR w="12700" cap="flat" cmpd="sng" algn="ctr">
+                      <a:solidFill>
+                        <a:schemeClr val="tx1"/>
+                      </a:solidFill>
+                      <a:prstDash val="solid"/>
+                      <a:round/>
+                      <a:headEnd type="none" w="med" len="med"/>
+                      <a:tailEnd type="none" w="med" len="med"/>
+                    </a:lnR>
+                    <a:lnT w="12700" cap="flat" cmpd="sng" algn="ctr">
+                      <a:solidFill>
+                        <a:schemeClr val="tx1"/>
+                      </a:solidFill>
+                      <a:prstDash val="solid"/>
+                      <a:round/>
+                      <a:headEnd type="none" w="med" len="med"/>
+                      <a:tailEnd type="none" w="med" len="med"/>
+                    </a:lnT>
+                    <a:lnB w="12700" cap="flat" cmpd="sng" algn="ctr">
+                      <a:solidFill>
+                        <a:schemeClr val="tx1"/>
+                      </a:solidFill>
+                      <a:prstDash val="solid"/>
+                      <a:round/>
+                      <a:headEnd type="none" w="med" len="med"/>
+                      <a:tailEnd type="none" w="med" len="med"/>
+                    </a:lnB>
+                    <a:solidFill>
+                      <a:srgbClr val="EE2385"/>
+                    </a:solidFill>
+                  </a:tcPr>
+                </a:tc>
+                <a:tc>
+                  <a:txBody>
+                    <a:bodyPr/>
+                    <a:lstStyle/>
+                    <a:p>
+                      <a:r>
+                        <a:rPr lang="en-US" dirty="0"/>
+                        <a:t>Mean Petal length</a:t>
+                      </a:r>
+                    </a:p>
+                  </a:txBody>
+                  <a:tcPr>
+                    <a:lnL w="12700" cap="flat" cmpd="sng" algn="ctr">
+                      <a:solidFill>
+                        <a:schemeClr val="tx1"/>
+                      </a:solidFill>
+                      <a:prstDash val="solid"/>
+                      <a:round/>
+                      <a:headEnd type="none" w="med" len="med"/>
+                      <a:tailEnd type="none" w="med" len="med"/>
+                    </a:lnL>
+                    <a:lnR w="12700" cap="flat" cmpd="sng" algn="ctr">
+                      <a:solidFill>
+                        <a:schemeClr val="tx1"/>
+                      </a:solidFill>
+                      <a:prstDash val="solid"/>
+                      <a:round/>
+                      <a:headEnd type="none" w="med" len="med"/>
+                      <a:tailEnd type="none" w="med" len="med"/>
+                    </a:lnR>
+                    <a:lnT w="12700" cap="flat" cmpd="sng" algn="ctr">
+                      <a:solidFill>
+                        <a:schemeClr val="tx1"/>
+                      </a:solidFill>
+                      <a:prstDash val="solid"/>
+                      <a:round/>
+                      <a:headEnd type="none" w="med" len="med"/>
+                      <a:tailEnd type="none" w="med" len="med"/>
+                    </a:lnT>
+                    <a:lnB w="12700" cap="flat" cmpd="sng" algn="ctr">
+                      <a:solidFill>
+                        <a:schemeClr val="tx1"/>
+                      </a:solidFill>
+                      <a:prstDash val="solid"/>
+                      <a:round/>
+                      <a:headEnd type="none" w="med" len="med"/>
+                      <a:tailEnd type="none" w="med" len="med"/>
+                    </a:lnB>
+                    <a:solidFill>
+                      <a:srgbClr val="EE2385"/>
+                    </a:solidFill>
+                  </a:tcPr>
+                </a:tc>
+                <a:tc>
+                  <a:txBody>
+                    <a:bodyPr/>
+                    <a:lstStyle/>
+                    <a:p>
+                      <a:r>
+                        <a:rPr lang="en-US" dirty="0"/>
+                        <a:t>Number of petals</a:t>
+                      </a:r>
+                    </a:p>
+                  </a:txBody>
+                  <a:tcPr>
+                    <a:lnL w="12700" cap="flat" cmpd="sng" algn="ctr">
+                      <a:solidFill>
+                        <a:schemeClr val="tx1"/>
+                      </a:solidFill>
+                      <a:prstDash val="solid"/>
+                      <a:round/>
+                      <a:headEnd type="none" w="med" len="med"/>
+                      <a:tailEnd type="none" w="med" len="med"/>
+                    </a:lnL>
+                    <a:lnR w="12700" cap="flat" cmpd="sng" algn="ctr">
+                      <a:solidFill>
+                        <a:schemeClr val="tx1"/>
+                      </a:solidFill>
+                      <a:prstDash val="solid"/>
+                      <a:round/>
+                      <a:headEnd type="none" w="med" len="med"/>
+                      <a:tailEnd type="none" w="med" len="med"/>
+                    </a:lnR>
+                    <a:lnT w="12700" cap="flat" cmpd="sng" algn="ctr">
+                      <a:solidFill>
+                        <a:schemeClr val="tx1"/>
+                      </a:solidFill>
+                      <a:prstDash val="solid"/>
+                      <a:round/>
+                      <a:headEnd type="none" w="med" len="med"/>
+                      <a:tailEnd type="none" w="med" len="med"/>
+                    </a:lnT>
+                    <a:lnB w="12700" cap="flat" cmpd="sng" algn="ctr">
+                      <a:solidFill>
+                        <a:schemeClr val="tx1"/>
+                      </a:solidFill>
+                      <a:prstDash val="solid"/>
+                      <a:round/>
+                      <a:headEnd type="none" w="med" len="med"/>
+                      <a:tailEnd type="none" w="med" len="med"/>
+                    </a:lnB>
+                    <a:solidFill>
+                      <a:srgbClr val="EE2385"/>
+                    </a:solidFill>
+                  </a:tcPr>
+                </a:tc>
+                <a:tc>
+                  <a:txBody>
+                    <a:bodyPr/>
+                    <a:lstStyle/>
+                    <a:p>
+                      <a:r>
+                        <a:rPr lang="en-US" dirty="0"/>
+                        <a:t>Color</a:t>
+                      </a:r>
+                    </a:p>
+                  </a:txBody>
+                  <a:tcPr>
+                    <a:lnL w="12700" cap="flat" cmpd="sng" algn="ctr">
+                      <a:solidFill>
+                        <a:schemeClr val="tx1"/>
+                      </a:solidFill>
+                      <a:prstDash val="solid"/>
+                      <a:round/>
+                      <a:headEnd type="none" w="med" len="med"/>
+                      <a:tailEnd type="none" w="med" len="med"/>
+                    </a:lnL>
+                    <a:lnR w="12700" cap="flat" cmpd="sng" algn="ctr">
+                      <a:solidFill>
+                        <a:schemeClr val="tx1"/>
+                      </a:solidFill>
+                      <a:prstDash val="solid"/>
+                      <a:round/>
+                      <a:headEnd type="none" w="med" len="med"/>
+                      <a:tailEnd type="none" w="med" len="med"/>
+                    </a:lnR>
+                    <a:lnT w="12700" cap="flat" cmpd="sng" algn="ctr">
+                      <a:solidFill>
+                        <a:schemeClr val="tx1"/>
+                      </a:solidFill>
+                      <a:prstDash val="solid"/>
+                      <a:round/>
+                      <a:headEnd type="none" w="med" len="med"/>
+                      <a:tailEnd type="none" w="med" len="med"/>
+                    </a:lnT>
+                    <a:lnB w="12700" cap="flat" cmpd="sng" algn="ctr">
+                      <a:solidFill>
+                        <a:schemeClr val="tx1"/>
+                      </a:solidFill>
+                      <a:prstDash val="solid"/>
+                      <a:round/>
+                      <a:headEnd type="none" w="med" len="med"/>
+                      <a:tailEnd type="none" w="med" len="med"/>
+                    </a:lnB>
+                    <a:solidFill>
+                      <a:srgbClr val="EE2385"/>
+                    </a:solidFill>
+                  </a:tcPr>
+                </a:tc>
+                <a:tc>
+                  <a:txBody>
+                    <a:bodyPr/>
+                    <a:lstStyle/>
+                    <a:p>
+                      <a:r>
+                        <a:rPr lang="en-US" dirty="0"/>
+                        <a:t>Sample date</a:t>
+                      </a:r>
+                    </a:p>
+                  </a:txBody>
+                  <a:tcPr>
+                    <a:lnL w="12700" cap="flat" cmpd="sng" algn="ctr">
+                      <a:solidFill>
+                        <a:schemeClr val="tx1"/>
+                      </a:solidFill>
+                      <a:prstDash val="solid"/>
+                      <a:round/>
+                      <a:headEnd type="none" w="med" len="med"/>
+                      <a:tailEnd type="none" w="med" len="med"/>
+                    </a:lnL>
+                    <a:lnR w="12700" cap="flat" cmpd="sng" algn="ctr">
+                      <a:solidFill>
+                        <a:schemeClr val="tx1"/>
+                      </a:solidFill>
+                      <a:prstDash val="solid"/>
+                      <a:round/>
+                      <a:headEnd type="none" w="med" len="med"/>
+                      <a:tailEnd type="none" w="med" len="med"/>
+                    </a:lnR>
+                    <a:lnT w="12700" cap="flat" cmpd="sng" algn="ctr">
+                      <a:solidFill>
+                        <a:schemeClr val="tx1"/>
+                      </a:solidFill>
+                      <a:prstDash val="solid"/>
+                      <a:round/>
+                      <a:headEnd type="none" w="med" len="med"/>
+                      <a:tailEnd type="none" w="med" len="med"/>
+                    </a:lnT>
+                    <a:lnB w="12700" cap="flat" cmpd="sng" algn="ctr">
+                      <a:solidFill>
+                        <a:schemeClr val="tx1"/>
+                      </a:solidFill>
+                      <a:prstDash val="solid"/>
+                      <a:round/>
+                      <a:headEnd type="none" w="med" len="med"/>
+                      <a:tailEnd type="none" w="med" len="med"/>
+                    </a:lnB>
+                    <a:solidFill>
+                      <a:srgbClr val="EE2385"/>
+                    </a:solidFill>
+                  </a:tcPr>
+                </a:tc>
+                <a:extLst>
+                  <a:ext uri="{0D108BD9-81ED-4DB2-BD59-A6C34878D82A}">
+                    <a16:rowId xmlns:a16="http://schemas.microsoft.com/office/drawing/2014/main" val="2796228789"/>
+                  </a:ext>
+                </a:extLst>
+              </a:tr>
+              <a:tr h="370591">
+                <a:tc>
+                  <a:txBody>
+                    <a:bodyPr/>
+                    <a:lstStyle/>
+                    <a:p>
+                      <a:r>
+                        <a:rPr lang="en-US" dirty="0"/>
+                        <a:t>1</a:t>
+                      </a:r>
+                    </a:p>
+                  </a:txBody>
+                  <a:tcPr>
+                    <a:lnL w="12700" cap="flat" cmpd="sng" algn="ctr">
+                      <a:solidFill>
+                        <a:schemeClr val="tx1"/>
+                      </a:solidFill>
+                      <a:prstDash val="solid"/>
+                      <a:round/>
+                      <a:headEnd type="none" w="med" len="med"/>
+                      <a:tailEnd type="none" w="med" len="med"/>
+                    </a:lnL>
+                    <a:lnR w="12700" cap="flat" cmpd="sng" algn="ctr">
+                      <a:solidFill>
+                        <a:schemeClr val="tx1"/>
+                      </a:solidFill>
+                      <a:prstDash val="solid"/>
+                      <a:round/>
+                      <a:headEnd type="none" w="med" len="med"/>
+                      <a:tailEnd type="none" w="med" len="med"/>
+                    </a:lnR>
+                    <a:lnT w="12700" cap="flat" cmpd="sng" algn="ctr">
+                      <a:solidFill>
+                        <a:schemeClr val="tx1"/>
+                      </a:solidFill>
+                      <a:prstDash val="solid"/>
+                      <a:round/>
+                      <a:headEnd type="none" w="med" len="med"/>
+                      <a:tailEnd type="none" w="med" len="med"/>
+                    </a:lnT>
+                    <a:lnB w="12700" cap="flat" cmpd="sng" algn="ctr">
+                      <a:solidFill>
+                        <a:schemeClr val="tx1"/>
+                      </a:solidFill>
+                      <a:prstDash val="solid"/>
+                      <a:round/>
+                      <a:headEnd type="none" w="med" len="med"/>
+                      <a:tailEnd type="none" w="med" len="med"/>
+                    </a:lnB>
+                  </a:tcPr>
+                </a:tc>
+                <a:tc>
+                  <a:txBody>
+                    <a:bodyPr/>
+                    <a:lstStyle/>
+                    <a:p>
+                      <a:r>
+                        <a:rPr lang="en-US" dirty="0"/>
+                        <a:t>5.32</a:t>
+                      </a:r>
+                    </a:p>
+                  </a:txBody>
+                  <a:tcPr>
+                    <a:lnL w="12700" cap="flat" cmpd="sng" algn="ctr">
+                      <a:solidFill>
+                        <a:schemeClr val="tx1"/>
+                      </a:solidFill>
+                      <a:prstDash val="solid"/>
+                      <a:round/>
+                      <a:headEnd type="none" w="med" len="med"/>
+                      <a:tailEnd type="none" w="med" len="med"/>
+                    </a:lnL>
+                    <a:lnR w="12700" cap="flat" cmpd="sng" algn="ctr">
+                      <a:solidFill>
+                        <a:schemeClr val="tx1"/>
+                      </a:solidFill>
+                      <a:prstDash val="solid"/>
+                      <a:round/>
+                      <a:headEnd type="none" w="med" len="med"/>
+                      <a:tailEnd type="none" w="med" len="med"/>
+                    </a:lnR>
+                    <a:lnT w="12700" cap="flat" cmpd="sng" algn="ctr">
+                      <a:solidFill>
+                        <a:schemeClr val="tx1"/>
+                      </a:solidFill>
+                      <a:prstDash val="solid"/>
+                      <a:round/>
+                      <a:headEnd type="none" w="med" len="med"/>
+                      <a:tailEnd type="none" w="med" len="med"/>
+                    </a:lnT>
+                    <a:lnB w="12700" cap="flat" cmpd="sng" algn="ctr">
+                      <a:solidFill>
+                        <a:schemeClr val="tx1"/>
+                      </a:solidFill>
+                      <a:prstDash val="solid"/>
+                      <a:round/>
+                      <a:headEnd type="none" w="med" len="med"/>
+                      <a:tailEnd type="none" w="med" len="med"/>
+                    </a:lnB>
+                  </a:tcPr>
+                </a:tc>
+                <a:tc>
+                  <a:txBody>
+                    <a:bodyPr/>
+                    <a:lstStyle/>
+                    <a:p>
+                      <a:r>
+                        <a:rPr lang="en-US" dirty="0"/>
+                        <a:t>5</a:t>
+                      </a:r>
+                    </a:p>
+                  </a:txBody>
+                  <a:tcPr>
+                    <a:lnL w="12700" cap="flat" cmpd="sng" algn="ctr">
+                      <a:solidFill>
+                        <a:schemeClr val="tx1"/>
+                      </a:solidFill>
+                      <a:prstDash val="solid"/>
+                      <a:round/>
+                      <a:headEnd type="none" w="med" len="med"/>
+                      <a:tailEnd type="none" w="med" len="med"/>
+                    </a:lnL>
+                    <a:lnR w="12700" cap="flat" cmpd="sng" algn="ctr">
+                      <a:solidFill>
+                        <a:schemeClr val="tx1"/>
+                      </a:solidFill>
+                      <a:prstDash val="solid"/>
+                      <a:round/>
+                      <a:headEnd type="none" w="med" len="med"/>
+                      <a:tailEnd type="none" w="med" len="med"/>
+                    </a:lnR>
+                    <a:lnT w="12700" cap="flat" cmpd="sng" algn="ctr">
+                      <a:solidFill>
+                        <a:schemeClr val="tx1"/>
+                      </a:solidFill>
+                      <a:prstDash val="solid"/>
+                      <a:round/>
+                      <a:headEnd type="none" w="med" len="med"/>
+                      <a:tailEnd type="none" w="med" len="med"/>
+                    </a:lnT>
+                    <a:lnB w="12700" cap="flat" cmpd="sng" algn="ctr">
+                      <a:solidFill>
+                        <a:schemeClr val="tx1"/>
+                      </a:solidFill>
+                      <a:prstDash val="solid"/>
+                      <a:round/>
+                      <a:headEnd type="none" w="med" len="med"/>
+                      <a:tailEnd type="none" w="med" len="med"/>
+                    </a:lnB>
+                  </a:tcPr>
+                </a:tc>
+                <a:tc>
+                  <a:txBody>
+                    <a:bodyPr/>
+                    <a:lstStyle/>
+                    <a:p>
+                      <a:r>
+                        <a:rPr lang="en-US" dirty="0"/>
+                        <a:t>Pink</a:t>
+                      </a:r>
+                    </a:p>
+                  </a:txBody>
+                  <a:tcPr>
+                    <a:lnL w="12700" cap="flat" cmpd="sng" algn="ctr">
+                      <a:solidFill>
+                        <a:schemeClr val="tx1"/>
+                      </a:solidFill>
+                      <a:prstDash val="solid"/>
+                      <a:round/>
+                      <a:headEnd type="none" w="med" len="med"/>
+                      <a:tailEnd type="none" w="med" len="med"/>
+                    </a:lnL>
+                    <a:lnR w="12700" cap="flat" cmpd="sng" algn="ctr">
+                      <a:solidFill>
+                        <a:schemeClr val="tx1"/>
+                      </a:solidFill>
+                      <a:prstDash val="solid"/>
+                      <a:round/>
+                      <a:headEnd type="none" w="med" len="med"/>
+                      <a:tailEnd type="none" w="med" len="med"/>
+                    </a:lnR>
+                    <a:lnT w="12700" cap="flat" cmpd="sng" algn="ctr">
+                      <a:solidFill>
+                        <a:schemeClr val="tx1"/>
+                      </a:solidFill>
+                      <a:prstDash val="solid"/>
+                      <a:round/>
+                      <a:headEnd type="none" w="med" len="med"/>
+                      <a:tailEnd type="none" w="med" len="med"/>
+                    </a:lnT>
+                    <a:lnB w="12700" cap="flat" cmpd="sng" algn="ctr">
+                      <a:solidFill>
+                        <a:schemeClr val="tx1"/>
+                      </a:solidFill>
+                      <a:prstDash val="solid"/>
+                      <a:round/>
+                      <a:headEnd type="none" w="med" len="med"/>
+                      <a:tailEnd type="none" w="med" len="med"/>
+                    </a:lnB>
+                  </a:tcPr>
+                </a:tc>
+                <a:tc>
+                  <a:txBody>
+                    <a:bodyPr/>
+                    <a:lstStyle/>
+                    <a:p>
+                      <a:r>
+                        <a:rPr lang="en-US" dirty="0"/>
+                        <a:t>10/1/23</a:t>
+                      </a:r>
+                    </a:p>
+                  </a:txBody>
+                  <a:tcPr>
+                    <a:lnL w="12700" cap="flat" cmpd="sng" algn="ctr">
+                      <a:solidFill>
+                        <a:schemeClr val="tx1"/>
+                      </a:solidFill>
+                      <a:prstDash val="solid"/>
+                      <a:round/>
+                      <a:headEnd type="none" w="med" len="med"/>
+                      <a:tailEnd type="none" w="med" len="med"/>
+                    </a:lnL>
+                    <a:lnR w="12700" cap="flat" cmpd="sng" algn="ctr">
+                      <a:solidFill>
+                        <a:schemeClr val="tx1"/>
+                      </a:solidFill>
+                      <a:prstDash val="solid"/>
+                      <a:round/>
+                      <a:headEnd type="none" w="med" len="med"/>
+                      <a:tailEnd type="none" w="med" len="med"/>
+                    </a:lnR>
+                    <a:lnT w="12700" cap="flat" cmpd="sng" algn="ctr">
+                      <a:solidFill>
+                        <a:schemeClr val="tx1"/>
+                      </a:solidFill>
+                      <a:prstDash val="solid"/>
+                      <a:round/>
+                      <a:headEnd type="none" w="med" len="med"/>
+                      <a:tailEnd type="none" w="med" len="med"/>
+                    </a:lnT>
+                    <a:lnB w="12700" cap="flat" cmpd="sng" algn="ctr">
+                      <a:solidFill>
+                        <a:schemeClr val="tx1"/>
+                      </a:solidFill>
+                      <a:prstDash val="solid"/>
+                      <a:round/>
+                      <a:headEnd type="none" w="med" len="med"/>
+                      <a:tailEnd type="none" w="med" len="med"/>
+                    </a:lnB>
+                  </a:tcPr>
+                </a:tc>
+                <a:extLst>
+                  <a:ext uri="{0D108BD9-81ED-4DB2-BD59-A6C34878D82A}">
+                    <a16:rowId xmlns:a16="http://schemas.microsoft.com/office/drawing/2014/main" val="2272354808"/>
+                  </a:ext>
+                </a:extLst>
+              </a:tr>
+              <a:tr h="370591">
+                <a:tc>
+                  <a:txBody>
+                    <a:bodyPr/>
+                    <a:lstStyle/>
+                    <a:p>
+                      <a:r>
+                        <a:rPr lang="en-US" dirty="0"/>
+                        <a:t>2</a:t>
+                      </a:r>
+                    </a:p>
+                  </a:txBody>
+                  <a:tcPr>
+                    <a:lnL w="12700" cap="flat" cmpd="sng" algn="ctr">
+                      <a:solidFill>
+                        <a:schemeClr val="tx1"/>
+                      </a:solidFill>
+                      <a:prstDash val="solid"/>
+                      <a:round/>
+                      <a:headEnd type="none" w="med" len="med"/>
+                      <a:tailEnd type="none" w="med" len="med"/>
+                    </a:lnL>
+                    <a:lnR w="12700" cap="flat" cmpd="sng" algn="ctr">
+                      <a:solidFill>
+                        <a:schemeClr val="tx1"/>
+                      </a:solidFill>
+                      <a:prstDash val="solid"/>
+                      <a:round/>
+                      <a:headEnd type="none" w="med" len="med"/>
+                      <a:tailEnd type="none" w="med" len="med"/>
+                    </a:lnR>
+                    <a:lnT w="12700" cap="flat" cmpd="sng" algn="ctr">
+                      <a:solidFill>
+                        <a:schemeClr val="tx1"/>
+                      </a:solidFill>
+                      <a:prstDash val="solid"/>
+                      <a:round/>
+                      <a:headEnd type="none" w="med" len="med"/>
+                      <a:tailEnd type="none" w="med" len="med"/>
+                    </a:lnT>
+                    <a:lnB w="12700" cap="flat" cmpd="sng" algn="ctr">
+                      <a:solidFill>
+                        <a:schemeClr val="tx1"/>
+                      </a:solidFill>
+                      <a:prstDash val="solid"/>
+                      <a:round/>
+                      <a:headEnd type="none" w="med" len="med"/>
+                      <a:tailEnd type="none" w="med" len="med"/>
+                    </a:lnB>
+                  </a:tcPr>
+                </a:tc>
+                <a:tc>
+                  <a:txBody>
+                    <a:bodyPr/>
+                    <a:lstStyle/>
+                    <a:p>
+                      <a:r>
+                        <a:rPr lang="en-US" dirty="0"/>
+                        <a:t>4.32</a:t>
+                      </a:r>
+                    </a:p>
+                  </a:txBody>
+                  <a:tcPr>
+                    <a:lnL w="12700" cap="flat" cmpd="sng" algn="ctr">
+                      <a:solidFill>
+                        <a:schemeClr val="tx1"/>
+                      </a:solidFill>
+                      <a:prstDash val="solid"/>
+                      <a:round/>
+                      <a:headEnd type="none" w="med" len="med"/>
+                      <a:tailEnd type="none" w="med" len="med"/>
+                    </a:lnL>
+                    <a:lnR w="12700" cap="flat" cmpd="sng" algn="ctr">
+                      <a:solidFill>
+                        <a:schemeClr val="tx1"/>
+                      </a:solidFill>
+                      <a:prstDash val="solid"/>
+                      <a:round/>
+                      <a:headEnd type="none" w="med" len="med"/>
+                      <a:tailEnd type="none" w="med" len="med"/>
+                    </a:lnR>
+                    <a:lnT w="12700" cap="flat" cmpd="sng" algn="ctr">
+                      <a:solidFill>
+                        <a:schemeClr val="tx1"/>
+                      </a:solidFill>
+                      <a:prstDash val="solid"/>
+                      <a:round/>
+                      <a:headEnd type="none" w="med" len="med"/>
+                      <a:tailEnd type="none" w="med" len="med"/>
+                    </a:lnT>
+                    <a:lnB w="12700" cap="flat" cmpd="sng" algn="ctr">
+                      <a:solidFill>
+                        <a:schemeClr val="tx1"/>
+                      </a:solidFill>
+                      <a:prstDash val="solid"/>
+                      <a:round/>
+                      <a:headEnd type="none" w="med" len="med"/>
+                      <a:tailEnd type="none" w="med" len="med"/>
+                    </a:lnB>
+                  </a:tcPr>
+                </a:tc>
+                <a:tc>
+                  <a:txBody>
+                    <a:bodyPr/>
+                    <a:lstStyle/>
+                    <a:p>
+                      <a:r>
+                        <a:rPr lang="en-US" dirty="0"/>
+                        <a:t>5</a:t>
+                      </a:r>
+                    </a:p>
+                  </a:txBody>
+                  <a:tcPr>
+                    <a:lnL w="12700" cap="flat" cmpd="sng" algn="ctr">
+                      <a:solidFill>
+                        <a:schemeClr val="tx1"/>
+                      </a:solidFill>
+                      <a:prstDash val="solid"/>
+                      <a:round/>
+                      <a:headEnd type="none" w="med" len="med"/>
+                      <a:tailEnd type="none" w="med" len="med"/>
+                    </a:lnL>
+                    <a:lnR w="12700" cap="flat" cmpd="sng" algn="ctr">
+                      <a:solidFill>
+                        <a:schemeClr val="tx1"/>
+                      </a:solidFill>
+                      <a:prstDash val="solid"/>
+                      <a:round/>
+                      <a:headEnd type="none" w="med" len="med"/>
+                      <a:tailEnd type="none" w="med" len="med"/>
+                    </a:lnR>
+                    <a:lnT w="12700" cap="flat" cmpd="sng" algn="ctr">
+                      <a:solidFill>
+                        <a:schemeClr val="tx1"/>
+                      </a:solidFill>
+                      <a:prstDash val="solid"/>
+                      <a:round/>
+                      <a:headEnd type="none" w="med" len="med"/>
+                      <a:tailEnd type="none" w="med" len="med"/>
+                    </a:lnT>
+                    <a:lnB w="12700" cap="flat" cmpd="sng" algn="ctr">
+                      <a:solidFill>
+                        <a:schemeClr val="tx1"/>
+                      </a:solidFill>
+                      <a:prstDash val="solid"/>
+                      <a:round/>
+                      <a:headEnd type="none" w="med" len="med"/>
+                      <a:tailEnd type="none" w="med" len="med"/>
+                    </a:lnB>
+                  </a:tcPr>
+                </a:tc>
+                <a:tc>
+                  <a:txBody>
+                    <a:bodyPr/>
+                    <a:lstStyle/>
+                    <a:p>
+                      <a:r>
+                        <a:rPr lang="en-US" dirty="0"/>
+                        <a:t>Pink and white</a:t>
+                      </a:r>
+                    </a:p>
+                  </a:txBody>
+                  <a:tcPr>
+                    <a:lnL w="12700" cap="flat" cmpd="sng" algn="ctr">
+                      <a:solidFill>
+                        <a:schemeClr val="tx1"/>
+                      </a:solidFill>
+                      <a:prstDash val="solid"/>
+                      <a:round/>
+                      <a:headEnd type="none" w="med" len="med"/>
+                      <a:tailEnd type="none" w="med" len="med"/>
+                    </a:lnL>
+                    <a:lnR w="12700" cap="flat" cmpd="sng" algn="ctr">
+                      <a:solidFill>
+                        <a:schemeClr val="tx1"/>
+                      </a:solidFill>
+                      <a:prstDash val="solid"/>
+                      <a:round/>
+                      <a:headEnd type="none" w="med" len="med"/>
+                      <a:tailEnd type="none" w="med" len="med"/>
+                    </a:lnR>
+                    <a:lnT w="12700" cap="flat" cmpd="sng" algn="ctr">
+                      <a:solidFill>
+                        <a:schemeClr val="tx1"/>
+                      </a:solidFill>
+                      <a:prstDash val="solid"/>
+                      <a:round/>
+                      <a:headEnd type="none" w="med" len="med"/>
+                      <a:tailEnd type="none" w="med" len="med"/>
+                    </a:lnT>
+                    <a:lnB w="12700" cap="flat" cmpd="sng" algn="ctr">
+                      <a:solidFill>
+                        <a:schemeClr val="tx1"/>
+                      </a:solidFill>
+                      <a:prstDash val="solid"/>
+                      <a:round/>
+                      <a:headEnd type="none" w="med" len="med"/>
+                      <a:tailEnd type="none" w="med" len="med"/>
+                    </a:lnB>
+                  </a:tcPr>
+                </a:tc>
+                <a:tc>
+                  <a:txBody>
+                    <a:bodyPr/>
+                    <a:lstStyle/>
+                    <a:p>
+                      <a:r>
+                        <a:rPr lang="en-US" dirty="0"/>
+                        <a:t>10/1/23</a:t>
+                      </a:r>
+                    </a:p>
+                  </a:txBody>
+                  <a:tcPr>
+                    <a:lnL w="12700" cap="flat" cmpd="sng" algn="ctr">
+                      <a:solidFill>
+                        <a:schemeClr val="tx1"/>
+                      </a:solidFill>
+                      <a:prstDash val="solid"/>
+                      <a:round/>
+                      <a:headEnd type="none" w="med" len="med"/>
+                      <a:tailEnd type="none" w="med" len="med"/>
+                    </a:lnL>
+                    <a:lnR w="12700" cap="flat" cmpd="sng" algn="ctr">
+                      <a:solidFill>
+                        <a:schemeClr val="tx1"/>
+                      </a:solidFill>
+                      <a:prstDash val="solid"/>
+                      <a:round/>
+                      <a:headEnd type="none" w="med" len="med"/>
+                      <a:tailEnd type="none" w="med" len="med"/>
+                    </a:lnR>
+                    <a:lnT w="12700" cap="flat" cmpd="sng" algn="ctr">
+                      <a:solidFill>
+                        <a:schemeClr val="tx1"/>
+                      </a:solidFill>
+                      <a:prstDash val="solid"/>
+                      <a:round/>
+                      <a:headEnd type="none" w="med" len="med"/>
+                      <a:tailEnd type="none" w="med" len="med"/>
+                    </a:lnT>
+                    <a:lnB w="12700" cap="flat" cmpd="sng" algn="ctr">
+                      <a:solidFill>
+                        <a:schemeClr val="tx1"/>
+                      </a:solidFill>
+                      <a:prstDash val="solid"/>
+                      <a:round/>
+                      <a:headEnd type="none" w="med" len="med"/>
+                      <a:tailEnd type="none" w="med" len="med"/>
+                    </a:lnB>
+                  </a:tcPr>
+                </a:tc>
+                <a:extLst>
+                  <a:ext uri="{0D108BD9-81ED-4DB2-BD59-A6C34878D82A}">
+                    <a16:rowId xmlns:a16="http://schemas.microsoft.com/office/drawing/2014/main" val="1860478757"/>
+                  </a:ext>
+                </a:extLst>
+              </a:tr>
+              <a:tr h="639650">
+                <a:tc>
+                  <a:txBody>
+                    <a:bodyPr/>
+                    <a:lstStyle/>
+                    <a:p>
+                      <a:r>
+                        <a:rPr lang="en-US" dirty="0"/>
+                        <a:t>3</a:t>
+                      </a:r>
+                    </a:p>
+                  </a:txBody>
+                  <a:tcPr>
+                    <a:lnL w="12700" cap="flat" cmpd="sng" algn="ctr">
+                      <a:solidFill>
+                        <a:schemeClr val="tx1"/>
+                      </a:solidFill>
+                      <a:prstDash val="solid"/>
+                      <a:round/>
+                      <a:headEnd type="none" w="med" len="med"/>
+                      <a:tailEnd type="none" w="med" len="med"/>
+                    </a:lnL>
+                    <a:lnR w="12700" cap="flat" cmpd="sng" algn="ctr">
+                      <a:solidFill>
+                        <a:schemeClr val="tx1"/>
+                      </a:solidFill>
+                      <a:prstDash val="solid"/>
+                      <a:round/>
+                      <a:headEnd type="none" w="med" len="med"/>
+                      <a:tailEnd type="none" w="med" len="med"/>
+                    </a:lnR>
+                    <a:lnT w="12700" cap="flat" cmpd="sng" algn="ctr">
+                      <a:solidFill>
+                        <a:schemeClr val="tx1"/>
+                      </a:solidFill>
+                      <a:prstDash val="solid"/>
+                      <a:round/>
+                      <a:headEnd type="none" w="med" len="med"/>
+                      <a:tailEnd type="none" w="med" len="med"/>
+                    </a:lnT>
+                    <a:lnB w="12700" cap="flat" cmpd="sng" algn="ctr">
+                      <a:solidFill>
+                        <a:schemeClr val="tx1"/>
+                      </a:solidFill>
+                      <a:prstDash val="solid"/>
+                      <a:round/>
+                      <a:headEnd type="none" w="med" len="med"/>
+                      <a:tailEnd type="none" w="med" len="med"/>
+                    </a:lnB>
+                  </a:tcPr>
+                </a:tc>
+                <a:tc>
+                  <a:txBody>
+                    <a:bodyPr/>
+                    <a:lstStyle/>
+                    <a:p>
+                      <a:r>
+                        <a:rPr lang="en-US" dirty="0"/>
+                        <a:t>4.56</a:t>
+                      </a:r>
+                    </a:p>
+                  </a:txBody>
+                  <a:tcPr>
+                    <a:lnL w="12700" cap="flat" cmpd="sng" algn="ctr">
+                      <a:solidFill>
+                        <a:schemeClr val="tx1"/>
+                      </a:solidFill>
+                      <a:prstDash val="solid"/>
+                      <a:round/>
+                      <a:headEnd type="none" w="med" len="med"/>
+                      <a:tailEnd type="none" w="med" len="med"/>
+                    </a:lnL>
+                    <a:lnR w="12700" cap="flat" cmpd="sng" algn="ctr">
+                      <a:solidFill>
+                        <a:schemeClr val="tx1"/>
+                      </a:solidFill>
+                      <a:prstDash val="solid"/>
+                      <a:round/>
+                      <a:headEnd type="none" w="med" len="med"/>
+                      <a:tailEnd type="none" w="med" len="med"/>
+                    </a:lnR>
+                    <a:lnT w="12700" cap="flat" cmpd="sng" algn="ctr">
+                      <a:solidFill>
+                        <a:schemeClr val="tx1"/>
+                      </a:solidFill>
+                      <a:prstDash val="solid"/>
+                      <a:round/>
+                      <a:headEnd type="none" w="med" len="med"/>
+                      <a:tailEnd type="none" w="med" len="med"/>
+                    </a:lnT>
+                    <a:lnB w="12700" cap="flat" cmpd="sng" algn="ctr">
+                      <a:solidFill>
+                        <a:schemeClr val="tx1"/>
+                      </a:solidFill>
+                      <a:prstDash val="solid"/>
+                      <a:round/>
+                      <a:headEnd type="none" w="med" len="med"/>
+                      <a:tailEnd type="none" w="med" len="med"/>
+                    </a:lnB>
+                  </a:tcPr>
+                </a:tc>
+                <a:tc>
+                  <a:txBody>
+                    <a:bodyPr/>
+                    <a:lstStyle/>
+                    <a:p>
+                      <a:r>
+                        <a:rPr lang="en-US" dirty="0"/>
+                        <a:t>5</a:t>
+                      </a:r>
+                    </a:p>
+                  </a:txBody>
+                  <a:tcPr>
+                    <a:lnL w="12700" cap="flat" cmpd="sng" algn="ctr">
+                      <a:solidFill>
+                        <a:schemeClr val="tx1"/>
+                      </a:solidFill>
+                      <a:prstDash val="solid"/>
+                      <a:round/>
+                      <a:headEnd type="none" w="med" len="med"/>
+                      <a:tailEnd type="none" w="med" len="med"/>
+                    </a:lnL>
+                    <a:lnR w="12700" cap="flat" cmpd="sng" algn="ctr">
+                      <a:solidFill>
+                        <a:schemeClr val="tx1"/>
+                      </a:solidFill>
+                      <a:prstDash val="solid"/>
+                      <a:round/>
+                      <a:headEnd type="none" w="med" len="med"/>
+                      <a:tailEnd type="none" w="med" len="med"/>
+                    </a:lnR>
+                    <a:lnT w="12700" cap="flat" cmpd="sng" algn="ctr">
+                      <a:solidFill>
+                        <a:schemeClr val="tx1"/>
+                      </a:solidFill>
+                      <a:prstDash val="solid"/>
+                      <a:round/>
+                      <a:headEnd type="none" w="med" len="med"/>
+                      <a:tailEnd type="none" w="med" len="med"/>
+                    </a:lnT>
+                    <a:lnB w="12700" cap="flat" cmpd="sng" algn="ctr">
+                      <a:solidFill>
+                        <a:schemeClr val="tx1"/>
+                      </a:solidFill>
+                      <a:prstDash val="solid"/>
+                      <a:round/>
+                      <a:headEnd type="none" w="med" len="med"/>
+                      <a:tailEnd type="none" w="med" len="med"/>
+                    </a:lnB>
+                  </a:tcPr>
+                </a:tc>
+                <a:tc>
+                  <a:txBody>
+                    <a:bodyPr/>
+                    <a:lstStyle/>
+                    <a:p>
+                      <a:r>
+                        <a:rPr lang="en-US" dirty="0"/>
+                        <a:t>Yellow and white</a:t>
+                      </a:r>
+                    </a:p>
+                  </a:txBody>
+                  <a:tcPr>
+                    <a:lnL w="12700" cap="flat" cmpd="sng" algn="ctr">
+                      <a:solidFill>
+                        <a:schemeClr val="tx1"/>
+                      </a:solidFill>
+                      <a:prstDash val="solid"/>
+                      <a:round/>
+                      <a:headEnd type="none" w="med" len="med"/>
+                      <a:tailEnd type="none" w="med" len="med"/>
+                    </a:lnL>
+                    <a:lnR w="12700" cap="flat" cmpd="sng" algn="ctr">
+                      <a:solidFill>
+                        <a:schemeClr val="tx1"/>
+                      </a:solidFill>
+                      <a:prstDash val="solid"/>
+                      <a:round/>
+                      <a:headEnd type="none" w="med" len="med"/>
+                      <a:tailEnd type="none" w="med" len="med"/>
+                    </a:lnR>
+                    <a:lnT w="12700" cap="flat" cmpd="sng" algn="ctr">
+                      <a:solidFill>
+                        <a:schemeClr val="tx1"/>
+                      </a:solidFill>
+                      <a:prstDash val="solid"/>
+                      <a:round/>
+                      <a:headEnd type="none" w="med" len="med"/>
+                      <a:tailEnd type="none" w="med" len="med"/>
+                    </a:lnT>
+                    <a:lnB w="12700" cap="flat" cmpd="sng" algn="ctr">
+                      <a:solidFill>
+                        <a:schemeClr val="tx1"/>
+                      </a:solidFill>
+                      <a:prstDash val="solid"/>
+                      <a:round/>
+                      <a:headEnd type="none" w="med" len="med"/>
+                      <a:tailEnd type="none" w="med" len="med"/>
+                    </a:lnB>
+                  </a:tcPr>
+                </a:tc>
+                <a:tc>
+                  <a:txBody>
+                    <a:bodyPr/>
+                    <a:lstStyle/>
+                    <a:p>
+                      <a:r>
+                        <a:rPr lang="en-US" dirty="0"/>
+                        <a:t>10/1/23</a:t>
+                      </a:r>
+                    </a:p>
+                  </a:txBody>
+                  <a:tcPr>
+                    <a:lnL w="12700" cap="flat" cmpd="sng" algn="ctr">
+                      <a:solidFill>
+                        <a:schemeClr val="tx1"/>
+                      </a:solidFill>
+                      <a:prstDash val="solid"/>
+                      <a:round/>
+                      <a:headEnd type="none" w="med" len="med"/>
+                      <a:tailEnd type="none" w="med" len="med"/>
+                    </a:lnL>
+                    <a:lnR w="12700" cap="flat" cmpd="sng" algn="ctr">
+                      <a:solidFill>
+                        <a:schemeClr val="tx1"/>
+                      </a:solidFill>
+                      <a:prstDash val="solid"/>
+                      <a:round/>
+                      <a:headEnd type="none" w="med" len="med"/>
+                      <a:tailEnd type="none" w="med" len="med"/>
+                    </a:lnR>
+                    <a:lnT w="12700" cap="flat" cmpd="sng" algn="ctr">
+                      <a:solidFill>
+                        <a:schemeClr val="tx1"/>
+                      </a:solidFill>
+                      <a:prstDash val="solid"/>
+                      <a:round/>
+                      <a:headEnd type="none" w="med" len="med"/>
+                      <a:tailEnd type="none" w="med" len="med"/>
+                    </a:lnT>
+                    <a:lnB w="12700" cap="flat" cmpd="sng" algn="ctr">
+                      <a:solidFill>
+                        <a:schemeClr val="tx1"/>
+                      </a:solidFill>
+                      <a:prstDash val="solid"/>
+                      <a:round/>
+                      <a:headEnd type="none" w="med" len="med"/>
+                      <a:tailEnd type="none" w="med" len="med"/>
+                    </a:lnB>
+                  </a:tcPr>
+                </a:tc>
+                <a:extLst>
+                  <a:ext uri="{0D108BD9-81ED-4DB2-BD59-A6C34878D82A}">
+                    <a16:rowId xmlns:a16="http://schemas.microsoft.com/office/drawing/2014/main" val="445774601"/>
+                  </a:ext>
+                </a:extLst>
+              </a:tr>
+              <a:tr h="370591">
+                <a:tc>
+                  <a:txBody>
+                    <a:bodyPr/>
+                    <a:lstStyle/>
+                    <a:p>
+                      <a:r>
+                        <a:rPr lang="en-US" dirty="0"/>
+                        <a:t>4</a:t>
+                      </a:r>
+                    </a:p>
+                  </a:txBody>
+                  <a:tcPr>
+                    <a:lnL w="12700" cap="flat" cmpd="sng" algn="ctr">
+                      <a:solidFill>
+                        <a:schemeClr val="tx1"/>
+                      </a:solidFill>
+                      <a:prstDash val="solid"/>
+                      <a:round/>
+                      <a:headEnd type="none" w="med" len="med"/>
+                      <a:tailEnd type="none" w="med" len="med"/>
+                    </a:lnL>
+                    <a:lnR w="12700" cap="flat" cmpd="sng" algn="ctr">
+                      <a:solidFill>
+                        <a:schemeClr val="tx1"/>
+                      </a:solidFill>
+                      <a:prstDash val="solid"/>
+                      <a:round/>
+                      <a:headEnd type="none" w="med" len="med"/>
+                      <a:tailEnd type="none" w="med" len="med"/>
+                    </a:lnR>
+                    <a:lnT w="12700" cap="flat" cmpd="sng" algn="ctr">
+                      <a:solidFill>
+                        <a:schemeClr val="tx1"/>
+                      </a:solidFill>
+                      <a:prstDash val="solid"/>
+                      <a:round/>
+                      <a:headEnd type="none" w="med" len="med"/>
+                      <a:tailEnd type="none" w="med" len="med"/>
+                    </a:lnT>
+                    <a:lnB w="12700" cap="flat" cmpd="sng" algn="ctr">
+                      <a:solidFill>
+                        <a:schemeClr val="tx1"/>
+                      </a:solidFill>
+                      <a:prstDash val="solid"/>
+                      <a:round/>
+                      <a:headEnd type="none" w="med" len="med"/>
+                      <a:tailEnd type="none" w="med" len="med"/>
+                    </a:lnB>
+                  </a:tcPr>
+                </a:tc>
+                <a:tc>
+                  <a:txBody>
+                    <a:bodyPr/>
+                    <a:lstStyle/>
+                    <a:p>
+                      <a:r>
+                        <a:rPr lang="en-US" dirty="0"/>
+                        <a:t>7.4</a:t>
+                      </a:r>
+                    </a:p>
+                  </a:txBody>
+                  <a:tcPr>
+                    <a:lnL w="12700" cap="flat" cmpd="sng" algn="ctr">
+                      <a:solidFill>
+                        <a:schemeClr val="tx1"/>
+                      </a:solidFill>
+                      <a:prstDash val="solid"/>
+                      <a:round/>
+                      <a:headEnd type="none" w="med" len="med"/>
+                      <a:tailEnd type="none" w="med" len="med"/>
+                    </a:lnL>
+                    <a:lnR w="12700" cap="flat" cmpd="sng" algn="ctr">
+                      <a:solidFill>
+                        <a:schemeClr val="tx1"/>
+                      </a:solidFill>
+                      <a:prstDash val="solid"/>
+                      <a:round/>
+                      <a:headEnd type="none" w="med" len="med"/>
+                      <a:tailEnd type="none" w="med" len="med"/>
+                    </a:lnR>
+                    <a:lnT w="12700" cap="flat" cmpd="sng" algn="ctr">
+                      <a:solidFill>
+                        <a:schemeClr val="tx1"/>
+                      </a:solidFill>
+                      <a:prstDash val="solid"/>
+                      <a:round/>
+                      <a:headEnd type="none" w="med" len="med"/>
+                      <a:tailEnd type="none" w="med" len="med"/>
+                    </a:lnT>
+                    <a:lnB w="12700" cap="flat" cmpd="sng" algn="ctr">
+                      <a:solidFill>
+                        <a:schemeClr val="tx1"/>
+                      </a:solidFill>
+                      <a:prstDash val="solid"/>
+                      <a:round/>
+                      <a:headEnd type="none" w="med" len="med"/>
+                      <a:tailEnd type="none" w="med" len="med"/>
+                    </a:lnB>
+                  </a:tcPr>
+                </a:tc>
+                <a:tc>
+                  <a:txBody>
+                    <a:bodyPr/>
+                    <a:lstStyle/>
+                    <a:p>
+                      <a:r>
+                        <a:rPr lang="en-US" dirty="0"/>
+                        <a:t>5</a:t>
+                      </a:r>
+                    </a:p>
+                  </a:txBody>
+                  <a:tcPr>
+                    <a:lnL w="12700" cap="flat" cmpd="sng" algn="ctr">
+                      <a:solidFill>
+                        <a:schemeClr val="tx1"/>
+                      </a:solidFill>
+                      <a:prstDash val="solid"/>
+                      <a:round/>
+                      <a:headEnd type="none" w="med" len="med"/>
+                      <a:tailEnd type="none" w="med" len="med"/>
+                    </a:lnL>
+                    <a:lnR w="12700" cap="flat" cmpd="sng" algn="ctr">
+                      <a:solidFill>
+                        <a:schemeClr val="tx1"/>
+                      </a:solidFill>
+                      <a:prstDash val="solid"/>
+                      <a:round/>
+                      <a:headEnd type="none" w="med" len="med"/>
+                      <a:tailEnd type="none" w="med" len="med"/>
+                    </a:lnR>
+                    <a:lnT w="12700" cap="flat" cmpd="sng" algn="ctr">
+                      <a:solidFill>
+                        <a:schemeClr val="tx1"/>
+                      </a:solidFill>
+                      <a:prstDash val="solid"/>
+                      <a:round/>
+                      <a:headEnd type="none" w="med" len="med"/>
+                      <a:tailEnd type="none" w="med" len="med"/>
+                    </a:lnT>
+                    <a:lnB w="12700" cap="flat" cmpd="sng" algn="ctr">
+                      <a:solidFill>
+                        <a:schemeClr val="tx1"/>
+                      </a:solidFill>
+                      <a:prstDash val="solid"/>
+                      <a:round/>
+                      <a:headEnd type="none" w="med" len="med"/>
+                      <a:tailEnd type="none" w="med" len="med"/>
+                    </a:lnB>
+                  </a:tcPr>
+                </a:tc>
+                <a:tc>
+                  <a:txBody>
+                    <a:bodyPr/>
+                    <a:lstStyle/>
+                    <a:p>
+                      <a:r>
+                        <a:rPr lang="en-US" dirty="0"/>
+                        <a:t>Pink</a:t>
+                      </a:r>
+                    </a:p>
+                  </a:txBody>
+                  <a:tcPr>
+                    <a:lnL w="12700" cap="flat" cmpd="sng" algn="ctr">
+                      <a:solidFill>
+                        <a:schemeClr val="tx1"/>
+                      </a:solidFill>
+                      <a:prstDash val="solid"/>
+                      <a:round/>
+                      <a:headEnd type="none" w="med" len="med"/>
+                      <a:tailEnd type="none" w="med" len="med"/>
+                    </a:lnL>
+                    <a:lnR w="12700" cap="flat" cmpd="sng" algn="ctr">
+                      <a:solidFill>
+                        <a:schemeClr val="tx1"/>
+                      </a:solidFill>
+                      <a:prstDash val="solid"/>
+                      <a:round/>
+                      <a:headEnd type="none" w="med" len="med"/>
+                      <a:tailEnd type="none" w="med" len="med"/>
+                    </a:lnR>
+                    <a:lnT w="12700" cap="flat" cmpd="sng" algn="ctr">
+                      <a:solidFill>
+                        <a:schemeClr val="tx1"/>
+                      </a:solidFill>
+                      <a:prstDash val="solid"/>
+                      <a:round/>
+                      <a:headEnd type="none" w="med" len="med"/>
+                      <a:tailEnd type="none" w="med" len="med"/>
+                    </a:lnT>
+                    <a:lnB w="12700" cap="flat" cmpd="sng" algn="ctr">
+                      <a:solidFill>
+                        <a:schemeClr val="tx1"/>
+                      </a:solidFill>
+                      <a:prstDash val="solid"/>
+                      <a:round/>
+                      <a:headEnd type="none" w="med" len="med"/>
+                      <a:tailEnd type="none" w="med" len="med"/>
+                    </a:lnB>
+                  </a:tcPr>
+                </a:tc>
+                <a:tc>
+                  <a:txBody>
+                    <a:bodyPr/>
+                    <a:lstStyle/>
+                    <a:p>
+                      <a:r>
+                        <a:rPr lang="en-US" dirty="0"/>
+                        <a:t>10/1/23</a:t>
+                      </a:r>
+                    </a:p>
+                  </a:txBody>
+                  <a:tcPr>
+                    <a:lnL w="12700" cap="flat" cmpd="sng" algn="ctr">
+                      <a:solidFill>
+                        <a:schemeClr val="tx1"/>
+                      </a:solidFill>
+                      <a:prstDash val="solid"/>
+                      <a:round/>
+                      <a:headEnd type="none" w="med" len="med"/>
+                      <a:tailEnd type="none" w="med" len="med"/>
+                    </a:lnL>
+                    <a:lnR w="12700" cap="flat" cmpd="sng" algn="ctr">
+                      <a:solidFill>
+                        <a:schemeClr val="tx1"/>
+                      </a:solidFill>
+                      <a:prstDash val="solid"/>
+                      <a:round/>
+                      <a:headEnd type="none" w="med" len="med"/>
+                      <a:tailEnd type="none" w="med" len="med"/>
+                    </a:lnR>
+                    <a:lnT w="12700" cap="flat" cmpd="sng" algn="ctr">
+                      <a:solidFill>
+                        <a:schemeClr val="tx1"/>
+                      </a:solidFill>
+                      <a:prstDash val="solid"/>
+                      <a:round/>
+                      <a:headEnd type="none" w="med" len="med"/>
+                      <a:tailEnd type="none" w="med" len="med"/>
+                    </a:lnT>
+                    <a:lnB w="12700" cap="flat" cmpd="sng" algn="ctr">
+                      <a:solidFill>
+                        <a:schemeClr val="tx1"/>
+                      </a:solidFill>
+                      <a:prstDash val="solid"/>
+                      <a:round/>
+                      <a:headEnd type="none" w="med" len="med"/>
+                      <a:tailEnd type="none" w="med" len="med"/>
+                    </a:lnB>
+                  </a:tcPr>
+                </a:tc>
+                <a:extLst>
+                  <a:ext uri="{0D108BD9-81ED-4DB2-BD59-A6C34878D82A}">
+                    <a16:rowId xmlns:a16="http://schemas.microsoft.com/office/drawing/2014/main" val="4065279884"/>
+                  </a:ext>
+                </a:extLst>
+              </a:tr>
+              <a:tr h="370591">
+                <a:tc>
+                  <a:txBody>
+                    <a:bodyPr/>
+                    <a:lstStyle/>
+                    <a:p>
+                      <a:r>
+                        <a:rPr lang="en-US" dirty="0"/>
+                        <a:t>5</a:t>
+                      </a:r>
+                    </a:p>
+                  </a:txBody>
+                  <a:tcPr>
+                    <a:lnL w="12700" cap="flat" cmpd="sng" algn="ctr">
+                      <a:solidFill>
+                        <a:schemeClr val="tx1"/>
+                      </a:solidFill>
+                      <a:prstDash val="solid"/>
+                      <a:round/>
+                      <a:headEnd type="none" w="med" len="med"/>
+                      <a:tailEnd type="none" w="med" len="med"/>
+                    </a:lnL>
+                    <a:lnR w="12700" cap="flat" cmpd="sng" algn="ctr">
+                      <a:solidFill>
+                        <a:schemeClr val="tx1"/>
+                      </a:solidFill>
+                      <a:prstDash val="solid"/>
+                      <a:round/>
+                      <a:headEnd type="none" w="med" len="med"/>
+                      <a:tailEnd type="none" w="med" len="med"/>
+                    </a:lnR>
+                    <a:lnT w="12700" cap="flat" cmpd="sng" algn="ctr">
+                      <a:solidFill>
+                        <a:schemeClr val="tx1"/>
+                      </a:solidFill>
+                      <a:prstDash val="solid"/>
+                      <a:round/>
+                      <a:headEnd type="none" w="med" len="med"/>
+                      <a:tailEnd type="none" w="med" len="med"/>
+                    </a:lnT>
+                    <a:lnB w="12700" cap="flat" cmpd="sng" algn="ctr">
+                      <a:solidFill>
+                        <a:schemeClr val="tx1"/>
+                      </a:solidFill>
+                      <a:prstDash val="solid"/>
+                      <a:round/>
+                      <a:headEnd type="none" w="med" len="med"/>
+                      <a:tailEnd type="none" w="med" len="med"/>
+                    </a:lnB>
+                  </a:tcPr>
+                </a:tc>
+                <a:tc>
+                  <a:txBody>
+                    <a:bodyPr/>
+                    <a:lstStyle/>
+                    <a:p>
+                      <a:r>
+                        <a:rPr lang="en-US" dirty="0"/>
+                        <a:t>6.33</a:t>
+                      </a:r>
+                    </a:p>
+                  </a:txBody>
+                  <a:tcPr>
+                    <a:lnL w="12700" cap="flat" cmpd="sng" algn="ctr">
+                      <a:solidFill>
+                        <a:schemeClr val="tx1"/>
+                      </a:solidFill>
+                      <a:prstDash val="solid"/>
+                      <a:round/>
+                      <a:headEnd type="none" w="med" len="med"/>
+                      <a:tailEnd type="none" w="med" len="med"/>
+                    </a:lnL>
+                    <a:lnR w="12700" cap="flat" cmpd="sng" algn="ctr">
+                      <a:solidFill>
+                        <a:schemeClr val="tx1"/>
+                      </a:solidFill>
+                      <a:prstDash val="solid"/>
+                      <a:round/>
+                      <a:headEnd type="none" w="med" len="med"/>
+                      <a:tailEnd type="none" w="med" len="med"/>
+                    </a:lnR>
+                    <a:lnT w="12700" cap="flat" cmpd="sng" algn="ctr">
+                      <a:solidFill>
+                        <a:schemeClr val="tx1"/>
+                      </a:solidFill>
+                      <a:prstDash val="solid"/>
+                      <a:round/>
+                      <a:headEnd type="none" w="med" len="med"/>
+                      <a:tailEnd type="none" w="med" len="med"/>
+                    </a:lnT>
+                    <a:lnB w="12700" cap="flat" cmpd="sng" algn="ctr">
+                      <a:solidFill>
+                        <a:schemeClr val="tx1"/>
+                      </a:solidFill>
+                      <a:prstDash val="solid"/>
+                      <a:round/>
+                      <a:headEnd type="none" w="med" len="med"/>
+                      <a:tailEnd type="none" w="med" len="med"/>
+                    </a:lnB>
+                  </a:tcPr>
+                </a:tc>
+                <a:tc>
+                  <a:txBody>
+                    <a:bodyPr/>
+                    <a:lstStyle/>
+                    <a:p>
+                      <a:r>
+                        <a:rPr lang="en-US" dirty="0"/>
+                        <a:t>5</a:t>
+                      </a:r>
+                    </a:p>
+                  </a:txBody>
+                  <a:tcPr>
+                    <a:lnL w="12700" cap="flat" cmpd="sng" algn="ctr">
+                      <a:solidFill>
+                        <a:schemeClr val="tx1"/>
+                      </a:solidFill>
+                      <a:prstDash val="solid"/>
+                      <a:round/>
+                      <a:headEnd type="none" w="med" len="med"/>
+                      <a:tailEnd type="none" w="med" len="med"/>
+                    </a:lnL>
+                    <a:lnR w="12700" cap="flat" cmpd="sng" algn="ctr">
+                      <a:solidFill>
+                        <a:schemeClr val="tx1"/>
+                      </a:solidFill>
+                      <a:prstDash val="solid"/>
+                      <a:round/>
+                      <a:headEnd type="none" w="med" len="med"/>
+                      <a:tailEnd type="none" w="med" len="med"/>
+                    </a:lnR>
+                    <a:lnT w="12700" cap="flat" cmpd="sng" algn="ctr">
+                      <a:solidFill>
+                        <a:schemeClr val="tx1"/>
+                      </a:solidFill>
+                      <a:prstDash val="solid"/>
+                      <a:round/>
+                      <a:headEnd type="none" w="med" len="med"/>
+                      <a:tailEnd type="none" w="med" len="med"/>
+                    </a:lnT>
+                    <a:lnB w="12700" cap="flat" cmpd="sng" algn="ctr">
+                      <a:solidFill>
+                        <a:schemeClr val="tx1"/>
+                      </a:solidFill>
+                      <a:prstDash val="solid"/>
+                      <a:round/>
+                      <a:headEnd type="none" w="med" len="med"/>
+                      <a:tailEnd type="none" w="med" len="med"/>
+                    </a:lnB>
+                  </a:tcPr>
+                </a:tc>
+                <a:tc>
+                  <a:txBody>
+                    <a:bodyPr/>
+                    <a:lstStyle/>
+                    <a:p>
+                      <a:r>
+                        <a:rPr lang="en-US" dirty="0"/>
+                        <a:t>White and pink</a:t>
+                      </a:r>
+                    </a:p>
+                  </a:txBody>
+                  <a:tcPr>
+                    <a:lnL w="12700" cap="flat" cmpd="sng" algn="ctr">
+                      <a:solidFill>
+                        <a:schemeClr val="tx1"/>
+                      </a:solidFill>
+                      <a:prstDash val="solid"/>
+                      <a:round/>
+                      <a:headEnd type="none" w="med" len="med"/>
+                      <a:tailEnd type="none" w="med" len="med"/>
+                    </a:lnL>
+                    <a:lnR w="12700" cap="flat" cmpd="sng" algn="ctr">
+                      <a:solidFill>
+                        <a:schemeClr val="tx1"/>
+                      </a:solidFill>
+                      <a:prstDash val="solid"/>
+                      <a:round/>
+                      <a:headEnd type="none" w="med" len="med"/>
+                      <a:tailEnd type="none" w="med" len="med"/>
+                    </a:lnR>
+                    <a:lnT w="12700" cap="flat" cmpd="sng" algn="ctr">
+                      <a:solidFill>
+                        <a:schemeClr val="tx1"/>
+                      </a:solidFill>
+                      <a:prstDash val="solid"/>
+                      <a:round/>
+                      <a:headEnd type="none" w="med" len="med"/>
+                      <a:tailEnd type="none" w="med" len="med"/>
+                    </a:lnT>
+                    <a:lnB w="12700" cap="flat" cmpd="sng" algn="ctr">
+                      <a:solidFill>
+                        <a:schemeClr val="tx1"/>
+                      </a:solidFill>
+                      <a:prstDash val="solid"/>
+                      <a:round/>
+                      <a:headEnd type="none" w="med" len="med"/>
+                      <a:tailEnd type="none" w="med" len="med"/>
+                    </a:lnB>
+                  </a:tcPr>
+                </a:tc>
+                <a:tc>
+                  <a:txBody>
+                    <a:bodyPr/>
+                    <a:lstStyle/>
+                    <a:p>
+                      <a:r>
+                        <a:rPr lang="en-US" dirty="0"/>
+                        <a:t>10/1/23</a:t>
+                      </a:r>
+                    </a:p>
+                  </a:txBody>
+                  <a:tcPr>
+                    <a:lnL w="12700" cap="flat" cmpd="sng" algn="ctr">
+                      <a:solidFill>
+                        <a:schemeClr val="tx1"/>
+                      </a:solidFill>
+                      <a:prstDash val="solid"/>
+                      <a:round/>
+                      <a:headEnd type="none" w="med" len="med"/>
+                      <a:tailEnd type="none" w="med" len="med"/>
+                    </a:lnL>
+                    <a:lnR w="12700" cap="flat" cmpd="sng" algn="ctr">
+                      <a:solidFill>
+                        <a:schemeClr val="tx1"/>
+                      </a:solidFill>
+                      <a:prstDash val="solid"/>
+                      <a:round/>
+                      <a:headEnd type="none" w="med" len="med"/>
+                      <a:tailEnd type="none" w="med" len="med"/>
+                    </a:lnR>
+                    <a:lnT w="12700" cap="flat" cmpd="sng" algn="ctr">
+                      <a:solidFill>
+                        <a:schemeClr val="tx1"/>
+                      </a:solidFill>
+                      <a:prstDash val="solid"/>
+                      <a:round/>
+                      <a:headEnd type="none" w="med" len="med"/>
+                      <a:tailEnd type="none" w="med" len="med"/>
+                    </a:lnT>
+                    <a:lnB w="12700" cap="flat" cmpd="sng" algn="ctr">
+                      <a:solidFill>
+                        <a:schemeClr val="tx1"/>
+                      </a:solidFill>
+                      <a:prstDash val="solid"/>
+                      <a:round/>
+                      <a:headEnd type="none" w="med" len="med"/>
+                      <a:tailEnd type="none" w="med" len="med"/>
+                    </a:lnB>
+                  </a:tcPr>
+                </a:tc>
+                <a:extLst>
+                  <a:ext uri="{0D108BD9-81ED-4DB2-BD59-A6C34878D82A}">
+                    <a16:rowId xmlns:a16="http://schemas.microsoft.com/office/drawing/2014/main" val="1529275922"/>
+                  </a:ext>
+                </a:extLst>
+              </a:tr>
+            </a:tbl>
+          </a:graphicData>
+        </a:graphic>
+      </p:graphicFrame>
+    </p:spTree>
+    <p:extLst>
+      <p:ext uri="{BB962C8B-B14F-4D97-AF65-F5344CB8AC3E}">
+        <p14:creationId xmlns:p14="http://schemas.microsoft.com/office/powerpoint/2010/main" val="478599951"/>
+      </p:ext>
+    </p:extLst>
+  </p:cSld>
+  <p:clrMapOvr>
+    <a:masterClrMapping/>
+  </p:clrMapOvr>
+</p:sld>
+</file>
+
+<file path=ppt/slides/slide7.xml><?xml version="1.0" encoding="utf-8"?>
+<p:sld xmlns:a="http://schemas.openxmlformats.org/drawingml/2006/main" xmlns:r="http://schemas.openxmlformats.org/officeDocument/2006/relationships" xmlns:p="http://schemas.openxmlformats.org/presentationml/2006/main">
+  <p:cSld>
+    <p:bg>
+      <p:bgPr>
         <a:blipFill dpi="0" rotWithShape="1">
           <a:blip r:embed="rId2">
             <a:lum/>

</xml_diff>